<commit_message>
one- and two-trend initial evaluation complete
</commit_message>
<xml_diff>
--- a/single_trend_exploration/low_trend_exploration.pptx
+++ b/single_trend_exploration/low_trend_exploration.pptx
@@ -22,6 +22,7 @@
     <p:sldId id="269" r:id="rId17"/>
     <p:sldId id="270" r:id="rId18"/>
     <p:sldId id="271" r:id="rId19"/>
+    <p:sldId id="272" r:id="rId20"/>
   </p:sldIdLst>
   <p:sldSz cx="9144000" cy="6858000"/>
   <p:notesSz cx="7772400" cy="10058400"/>
@@ -2422,7 +2423,7 @@
                 </a:solidFill>
                 <a:latin typeface="Calibri"/>
               </a:rPr>
-              <a:t>3/17/17</a:t>
+              <a:t>3/18/17</a:t>
             </a:r>
             <a:endParaRPr/>
           </a:p>
@@ -2481,7 +2482,7 @@
                 <a:spcPct val="100000"/>
               </a:lnSpc>
             </a:pPr>
-            <a:fld id="{B034B5FA-35DD-4C02-A889-46268696661A}" type="slidenum">
+            <a:fld id="{D220A2CD-E295-4156-83D6-769EA2F1A477}" type="slidenum">
               <a:rPr lang="en-US" sz="1200">
                 <a:solidFill>
                   <a:srgbClr val="8b8b8b"/>
@@ -2953,7 +2954,7 @@
                 </a:solidFill>
                 <a:latin typeface="Calibri"/>
               </a:rPr>
-              <a:t>3/17/17</a:t>
+              <a:t>3/18/17</a:t>
             </a:r>
             <a:endParaRPr/>
           </a:p>
@@ -3012,7 +3013,7 @@
                 <a:spcPct val="100000"/>
               </a:lnSpc>
             </a:pPr>
-            <a:fld id="{935DEE77-318E-4D5C-871C-1CAB4CF5A09B}" type="slidenum">
+            <a:fld id="{7F84334A-6E66-43EA-A600-31D3653EE1C4}" type="slidenum">
               <a:rPr lang="en-US" sz="1200">
                 <a:solidFill>
                   <a:srgbClr val="8b8b8b"/>
@@ -3062,49 +3063,9 @@
           <a:chExt cx="0" cy="0"/>
         </a:xfrm>
       </p:grpSpPr>
-      <p:sp>
-        <p:nvSpPr>
-          <p:cNvPr id="78" name="CustomShape 1"/>
-          <p:cNvSpPr/>
-          <p:nvPr/>
-        </p:nvSpPr>
-        <p:spPr>
-          <a:xfrm>
-            <a:off x="152280" y="2666880"/>
-            <a:ext cx="1523520" cy="2558520"/>
-          </a:xfrm>
-          <a:prstGeom prst="rect">
-            <a:avLst/>
-          </a:prstGeom>
-          <a:noFill/>
-          <a:ln>
-            <a:noFill/>
-          </a:ln>
-        </p:spPr>
-        <p:txBody>
-          <a:bodyPr lIns="90000" rIns="90000" tIns="45000" bIns="45000"/>
-          <a:p>
-            <a:pPr>
-              <a:lnSpc>
-                <a:spcPct val="100000"/>
-              </a:lnSpc>
-            </a:pPr>
-            <a:r>
-              <a:rPr lang="en-US">
-                <a:solidFill>
-                  <a:srgbClr val="000000"/>
-                </a:solidFill>
-                <a:latin typeface="Calibri"/>
-              </a:rPr>
-              <a:t>to make this line up with labels, zoom to sites layer on arcmap and use default export size</a:t>
-            </a:r>
-            <a:endParaRPr/>
-          </a:p>
-        </p:txBody>
-      </p:sp>
       <p:pic>
         <p:nvPicPr>
-          <p:cNvPr id="79" name="Picture 2" descr=""/>
+          <p:cNvPr id="78" name="Picture 2" descr=""/>
           <p:cNvPicPr/>
           <p:nvPr/>
         </p:nvPicPr>
@@ -3129,7 +3090,7 @@
       </p:pic>
       <p:sp>
         <p:nvSpPr>
-          <p:cNvPr id="80" name="CustomShape 2"/>
+          <p:cNvPr id="79" name="CustomShape 1"/>
           <p:cNvSpPr/>
           <p:nvPr/>
         </p:nvSpPr>
@@ -3169,7 +3130,7 @@
       </p:sp>
       <p:sp>
         <p:nvSpPr>
-          <p:cNvPr id="81" name="CustomShape 3"/>
+          <p:cNvPr id="80" name="CustomShape 2"/>
           <p:cNvSpPr/>
           <p:nvPr/>
         </p:nvSpPr>
@@ -3209,7 +3170,7 @@
       </p:sp>
       <p:sp>
         <p:nvSpPr>
-          <p:cNvPr id="82" name="CustomShape 4"/>
+          <p:cNvPr id="81" name="CustomShape 3"/>
           <p:cNvSpPr/>
           <p:nvPr/>
         </p:nvSpPr>
@@ -3249,7 +3210,7 @@
       </p:sp>
       <p:sp>
         <p:nvSpPr>
-          <p:cNvPr id="83" name="CustomShape 5"/>
+          <p:cNvPr id="82" name="CustomShape 4"/>
           <p:cNvSpPr/>
           <p:nvPr/>
         </p:nvSpPr>
@@ -3289,7 +3250,7 @@
       </p:sp>
       <p:sp>
         <p:nvSpPr>
-          <p:cNvPr id="84" name="CustomShape 6"/>
+          <p:cNvPr id="83" name="CustomShape 5"/>
           <p:cNvSpPr/>
           <p:nvPr/>
         </p:nvSpPr>
@@ -3329,7 +3290,7 @@
       </p:sp>
       <p:sp>
         <p:nvSpPr>
-          <p:cNvPr id="85" name="CustomShape 7"/>
+          <p:cNvPr id="84" name="CustomShape 6"/>
           <p:cNvSpPr/>
           <p:nvPr/>
         </p:nvSpPr>
@@ -3369,7 +3330,7 @@
       </p:sp>
       <p:sp>
         <p:nvSpPr>
-          <p:cNvPr id="86" name="CustomShape 8"/>
+          <p:cNvPr id="85" name="CustomShape 7"/>
           <p:cNvSpPr/>
           <p:nvPr/>
         </p:nvSpPr>
@@ -3409,7 +3370,7 @@
       </p:sp>
       <p:sp>
         <p:nvSpPr>
-          <p:cNvPr id="87" name="CustomShape 9"/>
+          <p:cNvPr id="86" name="CustomShape 8"/>
           <p:cNvSpPr/>
           <p:nvPr/>
         </p:nvSpPr>
@@ -3449,7 +3410,7 @@
       </p:sp>
       <p:sp>
         <p:nvSpPr>
-          <p:cNvPr id="88" name="CustomShape 10"/>
+          <p:cNvPr id="87" name="CustomShape 9"/>
           <p:cNvSpPr/>
           <p:nvPr/>
         </p:nvSpPr>
@@ -3489,7 +3450,7 @@
       </p:sp>
       <p:sp>
         <p:nvSpPr>
-          <p:cNvPr id="89" name="CustomShape 11"/>
+          <p:cNvPr id="88" name="CustomShape 10"/>
           <p:cNvSpPr/>
           <p:nvPr/>
         </p:nvSpPr>
@@ -3529,7 +3490,7 @@
       </p:sp>
       <p:sp>
         <p:nvSpPr>
-          <p:cNvPr id="90" name="CustomShape 12"/>
+          <p:cNvPr id="89" name="CustomShape 11"/>
           <p:cNvSpPr/>
           <p:nvPr/>
         </p:nvSpPr>
@@ -3569,7 +3530,7 @@
       </p:sp>
       <p:sp>
         <p:nvSpPr>
-          <p:cNvPr id="91" name="CustomShape 13"/>
+          <p:cNvPr id="90" name="CustomShape 12"/>
           <p:cNvSpPr/>
           <p:nvPr/>
         </p:nvSpPr>
@@ -3609,7 +3570,7 @@
       </p:sp>
       <p:sp>
         <p:nvSpPr>
-          <p:cNvPr id="92" name="CustomShape 14"/>
+          <p:cNvPr id="91" name="CustomShape 13"/>
           <p:cNvSpPr/>
           <p:nvPr/>
         </p:nvSpPr>
@@ -3649,7 +3610,7 @@
       </p:sp>
       <p:sp>
         <p:nvSpPr>
-          <p:cNvPr id="93" name="CustomShape 15"/>
+          <p:cNvPr id="92" name="CustomShape 14"/>
           <p:cNvSpPr/>
           <p:nvPr/>
         </p:nvSpPr>
@@ -3689,7 +3650,7 @@
       </p:sp>
       <p:sp>
         <p:nvSpPr>
-          <p:cNvPr id="94" name="CustomShape 16"/>
+          <p:cNvPr id="93" name="CustomShape 15"/>
           <p:cNvSpPr/>
           <p:nvPr/>
         </p:nvSpPr>
@@ -3729,7 +3690,7 @@
       </p:sp>
       <p:sp>
         <p:nvSpPr>
-          <p:cNvPr id="95" name="CustomShape 17"/>
+          <p:cNvPr id="94" name="CustomShape 16"/>
           <p:cNvSpPr/>
           <p:nvPr/>
         </p:nvSpPr>
@@ -3769,7 +3730,7 @@
       </p:sp>
       <p:sp>
         <p:nvSpPr>
-          <p:cNvPr id="96" name="CustomShape 18"/>
+          <p:cNvPr id="95" name="CustomShape 17"/>
           <p:cNvSpPr/>
           <p:nvPr/>
         </p:nvSpPr>
@@ -3809,7 +3770,7 @@
       </p:sp>
       <p:sp>
         <p:nvSpPr>
-          <p:cNvPr id="97" name="CustomShape 19"/>
+          <p:cNvPr id="96" name="CustomShape 18"/>
           <p:cNvSpPr/>
           <p:nvPr/>
         </p:nvSpPr>
@@ -3849,7 +3810,7 @@
       </p:sp>
       <p:sp>
         <p:nvSpPr>
-          <p:cNvPr id="98" name="CustomShape 20"/>
+          <p:cNvPr id="97" name="CustomShape 19"/>
           <p:cNvSpPr/>
           <p:nvPr/>
         </p:nvSpPr>
@@ -3889,7 +3850,7 @@
       </p:sp>
       <p:sp>
         <p:nvSpPr>
-          <p:cNvPr id="99" name="Line 21"/>
+          <p:cNvPr id="98" name="Line 20"/>
           <p:cNvSpPr/>
           <p:nvPr/>
         </p:nvSpPr>
@@ -3911,7 +3872,7 @@
       </p:sp>
       <p:sp>
         <p:nvSpPr>
-          <p:cNvPr id="100" name="Line 22"/>
+          <p:cNvPr id="99" name="Line 21"/>
           <p:cNvSpPr/>
           <p:nvPr/>
         </p:nvSpPr>
@@ -3933,7 +3894,7 @@
       </p:sp>
       <p:sp>
         <p:nvSpPr>
-          <p:cNvPr id="101" name="Line 23"/>
+          <p:cNvPr id="100" name="Line 22"/>
           <p:cNvSpPr/>
           <p:nvPr/>
         </p:nvSpPr>
@@ -3952,6 +3913,43 @@
             <a:round/>
           </a:ln>
         </p:spPr>
+      </p:sp>
+      <p:sp>
+        <p:nvSpPr>
+          <p:cNvPr id="101" name="TextShape 23"/>
+          <p:cNvSpPr txBox="1"/>
+          <p:nvPr/>
+        </p:nvSpPr>
+        <p:spPr>
+          <a:xfrm>
+            <a:off x="177480" y="1409400"/>
+            <a:ext cx="1651320" cy="602280"/>
+          </a:xfrm>
+          <a:prstGeom prst="rect">
+            <a:avLst/>
+          </a:prstGeom>
+        </p:spPr>
+        <p:txBody>
+          <a:bodyPr lIns="90000" rIns="90000" tIns="45000" bIns="45000"/>
+          <a:p>
+            <a:r>
+              <a:rPr lang="en-US">
+                <a:latin typeface="Arial"/>
+              </a:rPr>
+              <a:t>Maps for </a:t>
+            </a:r>
+            <a:endParaRPr/>
+          </a:p>
+          <a:p>
+            <a:r>
+              <a:rPr lang="en-US">
+                <a:latin typeface="Arial"/>
+              </a:rPr>
+              <a:t>later reference</a:t>
+            </a:r>
+            <a:endParaRPr/>
+          </a:p>
+        </p:txBody>
       </p:sp>
     </p:spTree>
   </p:cSld>
@@ -4011,7 +4009,7 @@
         <p:spPr>
           <a:xfrm>
             <a:off x="1005840" y="548640"/>
-            <a:ext cx="8094960" cy="602280"/>
+            <a:ext cx="8094960" cy="858240"/>
           </a:xfrm>
           <a:prstGeom prst="rect">
             <a:avLst/>
@@ -4033,7 +4031,22 @@
               <a:rPr lang="en-US">
                 <a:latin typeface="Arial"/>
               </a:rPr>
-              <a:t>trend follows air temperature at a lag of 4.</a:t>
+              <a:t>trend follows air temperature at a lag of 2-6 and 9-11 (I'm looking at the two</a:t>
+            </a:r>
+            <a:endParaRPr/>
+          </a:p>
+          <a:p>
+            <a:r>
+              <a:rPr lang="en-US">
+                <a:latin typeface="Arial"/>
+              </a:rPr>
+              <a:t>“</a:t>
+            </a:r>
+            <a:r>
+              <a:rPr lang="en-US">
+                <a:latin typeface="Arial"/>
+              </a:rPr>
+              <a:t>peaks” in the upper right).</a:t>
             </a:r>
             <a:endParaRPr/>
           </a:p>
@@ -4376,8 +4389,8 @@
         </p:nvSpPr>
         <p:spPr>
           <a:xfrm>
-            <a:off x="731520" y="640080"/>
-            <a:ext cx="6712560" cy="602280"/>
+            <a:off x="731520" y="208080"/>
+            <a:ext cx="8407440" cy="858240"/>
           </a:xfrm>
           <a:prstGeom prst="rect">
             <a:avLst/>
@@ -4390,7 +4403,7 @@
               <a:rPr lang="en-US">
                 <a:latin typeface="Arial"/>
               </a:rPr>
-              <a:t>Shared trend 1 correlates with PC2. Still no correlation with PC1.</a:t>
+              <a:t>Shared trend 1 correlates with PC2. </a:t>
             </a:r>
             <a:endParaRPr/>
           </a:p>
@@ -4399,7 +4412,16 @@
               <a:rPr lang="en-US">
                 <a:latin typeface="Arial"/>
               </a:rPr>
-              <a:t>Here's cross-correlation:</a:t>
+              <a:t>Shared trend 2 correlates weakly with elevation, but not with PC1.</a:t>
+            </a:r>
+            <a:endParaRPr/>
+          </a:p>
+          <a:p>
+            <a:r>
+              <a:rPr lang="en-US">
+                <a:latin typeface="Arial"/>
+              </a:rPr>
+              <a:t>Here's cross-correlation between air temp and trend 1 (top), and trend 2 (bottom):</a:t>
             </a:r>
             <a:endParaRPr/>
           </a:p>
@@ -4419,7 +4441,7 @@
         </p:blipFill>
         <p:spPr>
           <a:xfrm>
-            <a:off x="-91080" y="1737360"/>
+            <a:off x="-91080" y="1115280"/>
             <a:ext cx="9143640" cy="4371120"/>
           </a:xfrm>
           <a:prstGeom prst="rect">
@@ -4430,6 +4452,34 @@
           </a:ln>
         </p:spPr>
       </p:pic>
+      <p:sp>
+        <p:nvSpPr>
+          <p:cNvPr id="122" name="TextShape 2"/>
+          <p:cNvSpPr txBox="1"/>
+          <p:nvPr/>
+        </p:nvSpPr>
+        <p:spPr>
+          <a:xfrm>
+            <a:off x="457200" y="5852160"/>
+            <a:ext cx="8399520" cy="346320"/>
+          </a:xfrm>
+          <a:prstGeom prst="rect">
+            <a:avLst/>
+          </a:prstGeom>
+        </p:spPr>
+        <p:txBody>
+          <a:bodyPr lIns="90000" rIns="90000" tIns="45000" bIns="45000"/>
+          <a:p>
+            <a:r>
+              <a:rPr lang="en-US">
+                <a:latin typeface="Arial"/>
+              </a:rPr>
+              <a:t>Now, the trends respond after 3-6 months with an inverse relationship to air temp.</a:t>
+            </a:r>
+            <a:endParaRPr/>
+          </a:p>
+        </p:txBody>
+      </p:sp>
     </p:spTree>
   </p:cSld>
   <p:timing>
@@ -4479,6 +4529,95 @@
           <a:chExt cx="0" cy="0"/>
         </a:xfrm>
       </p:grpSpPr>
+      <p:sp>
+        <p:nvSpPr>
+          <p:cNvPr id="123" name="TextShape 1"/>
+          <p:cNvSpPr txBox="1"/>
+          <p:nvPr/>
+        </p:nvSpPr>
+        <p:spPr>
+          <a:xfrm>
+            <a:off x="1035360" y="91440"/>
+            <a:ext cx="7285680" cy="1370160"/>
+          </a:xfrm>
+          <a:prstGeom prst="rect">
+            <a:avLst/>
+          </a:prstGeom>
+        </p:spPr>
+        <p:txBody>
+          <a:bodyPr lIns="90000" rIns="90000" tIns="45000" bIns="45000"/>
+          <a:p>
+            <a:r>
+              <a:rPr lang="en-US">
+                <a:latin typeface="Arial"/>
+              </a:rPr>
+              <a:t>The reason nothing correlates with PC1 is that the snowmelt covariate</a:t>
+            </a:r>
+            <a:endParaRPr/>
+          </a:p>
+          <a:p>
+            <a:r>
+              <a:rPr lang="en-US">
+                <a:latin typeface="Arial"/>
+              </a:rPr>
+              <a:t>accounts for elevational variation. If I leave snowmelt out of the model,</a:t>
+            </a:r>
+            <a:endParaRPr/>
+          </a:p>
+          <a:p>
+            <a:r>
+              <a:rPr lang="en-US">
+                <a:latin typeface="Arial"/>
+              </a:rPr>
+              <a:t>trend 2 correlates with PC1.</a:t>
+            </a:r>
+            <a:endParaRPr/>
+          </a:p>
+          <a:p>
+            <a:r>
+              <a:rPr lang="en-US">
+                <a:latin typeface="Arial"/>
+              </a:rPr>
+              <a:t>Here are the strongest relationships with trend 1 loadings, colored by</a:t>
+            </a:r>
+            <a:endParaRPr/>
+          </a:p>
+          <a:p>
+            <a:r>
+              <a:rPr lang="en-US">
+                <a:latin typeface="Arial"/>
+              </a:rPr>
+              <a:t>runoff:</a:t>
+            </a:r>
+            <a:endParaRPr/>
+          </a:p>
+        </p:txBody>
+      </p:sp>
+      <p:pic>
+        <p:nvPicPr>
+          <p:cNvPr id="124" name="" descr=""/>
+          <p:cNvPicPr/>
+          <p:nvPr/>
+        </p:nvPicPr>
+        <p:blipFill>
+          <a:blip r:embed="rId1"/>
+          <a:stretch>
+            <a:fillRect/>
+          </a:stretch>
+        </p:blipFill>
+        <p:spPr>
+          <a:xfrm>
+            <a:off x="914400" y="1737360"/>
+            <a:ext cx="6552000" cy="4675680"/>
+          </a:xfrm>
+          <a:prstGeom prst="rect">
+            <a:avLst/>
+          </a:prstGeom>
+          <a:ln>
+            <a:noFill/>
+          </a:ln>
+        </p:spPr>
+      </p:pic>
     </p:spTree>
   </p:cSld>
   <p:timing>
@@ -4528,6 +4667,68 @@
           <a:chExt cx="0" cy="0"/>
         </a:xfrm>
       </p:grpSpPr>
+      <p:sp>
+        <p:nvSpPr>
+          <p:cNvPr id="125" name="TextShape 1"/>
+          <p:cNvSpPr txBox="1"/>
+          <p:nvPr/>
+        </p:nvSpPr>
+        <p:spPr>
+          <a:xfrm>
+            <a:off x="1280160" y="457200"/>
+            <a:ext cx="6013080" cy="602280"/>
+          </a:xfrm>
+          <a:prstGeom prst="rect">
+            <a:avLst/>
+          </a:prstGeom>
+        </p:spPr>
+        <p:txBody>
+          <a:bodyPr lIns="90000" rIns="90000" tIns="45000" bIns="45000"/>
+          <a:p>
+            <a:r>
+              <a:rPr lang="en-US">
+                <a:latin typeface="Arial"/>
+              </a:rPr>
+              <a:t>Here are the strongest relationships with trend 2 loadings,</a:t>
+            </a:r>
+            <a:endParaRPr/>
+          </a:p>
+          <a:p>
+            <a:r>
+              <a:rPr lang="en-US">
+                <a:latin typeface="Arial"/>
+              </a:rPr>
+              <a:t>colored by elevation:</a:t>
+            </a:r>
+            <a:endParaRPr/>
+          </a:p>
+        </p:txBody>
+      </p:sp>
+      <p:pic>
+        <p:nvPicPr>
+          <p:cNvPr id="126" name="" descr=""/>
+          <p:cNvPicPr/>
+          <p:nvPr/>
+        </p:nvPicPr>
+        <p:blipFill>
+          <a:blip r:embed="rId1"/>
+          <a:stretch>
+            <a:fillRect/>
+          </a:stretch>
+        </p:blipFill>
+        <p:spPr>
+          <a:xfrm>
+            <a:off x="1371600" y="1725120"/>
+            <a:ext cx="6552000" cy="4675680"/>
+          </a:xfrm>
+          <a:prstGeom prst="rect">
+            <a:avLst/>
+          </a:prstGeom>
+          <a:ln>
+            <a:noFill/>
+          </a:ln>
+        </p:spPr>
+      </p:pic>
     </p:spTree>
   </p:cSld>
   <p:timing>
@@ -4537,6 +4738,108 @@
           <p:childTnLst>
             <p:seq>
               <p:cTn id="32" nodeType="mainSeq"/>
+              <p:prevCondLst>
+                <p:cond delay="0" evt="onPrev">
+                  <p:tgtEl>
+                    <p:sldTgt/>
+                  </p:tgtEl>
+                </p:cond>
+              </p:prevCondLst>
+              <p:nextCondLst>
+                <p:cond delay="0" evt="onNext">
+                  <p:tgtEl>
+                    <p:sldTgt/>
+                  </p:tgtEl>
+                </p:cond>
+              </p:nextCondLst>
+            </p:seq>
+          </p:childTnLst>
+        </p:cTn>
+      </p:par>
+    </p:tnLst>
+  </p:timing>
+</p:sld>
+</file>
+
+<file path=ppt/slides/slide17.xml><?xml version="1.0" encoding="utf-8"?>
+<p:sld xmlns:a="http://schemas.openxmlformats.org/drawingml/2006/main" xmlns:p="http://schemas.openxmlformats.org/presentationml/2006/main" xmlns:r="http://schemas.openxmlformats.org/officeDocument/2006/relationships">
+  <p:cSld>
+    <p:spTree>
+      <p:nvGrpSpPr>
+        <p:cNvPr id="1" name=""/>
+        <p:cNvGrpSpPr/>
+        <p:nvPr/>
+      </p:nvGrpSpPr>
+      <p:grpSpPr>
+        <a:xfrm>
+          <a:off x="0" y="0"/>
+          <a:ext cx="0" cy="0"/>
+          <a:chOff x="0" y="0"/>
+          <a:chExt cx="0" cy="0"/>
+        </a:xfrm>
+      </p:grpSpPr>
+      <p:pic>
+        <p:nvPicPr>
+          <p:cNvPr id="127" name="" descr=""/>
+          <p:cNvPicPr/>
+          <p:nvPr/>
+        </p:nvPicPr>
+        <p:blipFill>
+          <a:blip r:embed="rId1"/>
+          <a:stretch>
+            <a:fillRect/>
+          </a:stretch>
+        </p:blipFill>
+        <p:spPr>
+          <a:xfrm>
+            <a:off x="657000" y="1976400"/>
+            <a:ext cx="6552000" cy="4675680"/>
+          </a:xfrm>
+          <a:prstGeom prst="rect">
+            <a:avLst/>
+          </a:prstGeom>
+          <a:ln>
+            <a:noFill/>
+          </a:ln>
+        </p:spPr>
+      </p:pic>
+      <p:sp>
+        <p:nvSpPr>
+          <p:cNvPr id="128" name="TextShape 1"/>
+          <p:cNvSpPr txBox="1"/>
+          <p:nvPr/>
+        </p:nvSpPr>
+        <p:spPr>
+          <a:xfrm>
+            <a:off x="274320" y="803520"/>
+            <a:ext cx="7523280" cy="346320"/>
+          </a:xfrm>
+          <a:prstGeom prst="rect">
+            <a:avLst/>
+          </a:prstGeom>
+        </p:spPr>
+        <p:txBody>
+          <a:bodyPr lIns="90000" rIns="90000" tIns="45000" bIns="45000"/>
+          <a:p>
+            <a:r>
+              <a:rPr lang="en-US">
+                <a:latin typeface="Arial"/>
+              </a:rPr>
+              <a:t>And the final cross-correlation (air-trend_1 on top; air-trend_2 on bottom)</a:t>
+            </a:r>
+            <a:endParaRPr/>
+          </a:p>
+        </p:txBody>
+      </p:sp>
+    </p:spTree>
+  </p:cSld>
+  <p:timing>
+    <p:tnLst>
+      <p:par>
+        <p:cTn id="33" dur="indefinite" restart="never" nodeType="tmRoot">
+          <p:childTnLst>
+            <p:seq>
+              <p:cTn id="34" nodeType="mainSeq"/>
               <p:prevCondLst>
                 <p:cond delay="0" evt="onPrev">
                   <p:tgtEl>
@@ -4953,7 +5256,7 @@
         <p:spPr>
           <a:xfrm>
             <a:off x="640080" y="380160"/>
-            <a:ext cx="8029440" cy="1114200"/>
+            <a:ext cx="8242560" cy="1114200"/>
           </a:xfrm>
           <a:prstGeom prst="rect">
             <a:avLst/>
@@ -4975,7 +5278,7 @@
               <a:rPr lang="en-US">
                 <a:latin typeface="Arial"/>
               </a:rPr>
-              <a:t>The trend correlates with PC2, which is driven by runoff and Base Flow Index.</a:t>
+              <a:t>The loadings correlate with PC2, which is driven by runoff and Base Flow Index.</a:t>
             </a:r>
             <a:endParaRPr/>
           </a:p>
@@ -4984,7 +5287,7 @@
               <a:rPr lang="en-US">
                 <a:latin typeface="Arial"/>
               </a:rPr>
-              <a:t>It does not correlate with PC1, which contains slope, elevation, ice, etc.</a:t>
+              <a:t>They do not correlate with PC1, which includes slope, elevation, ice, etc.</a:t>
             </a:r>
             <a:endParaRPr/>
           </a:p>
@@ -4993,7 +5296,7 @@
               <a:rPr lang="en-US">
                 <a:latin typeface="Arial"/>
               </a:rPr>
-              <a:t>Points are colored by % watershed area over 1000m (blue=high, orange=low)</a:t>
+              <a:t>Points are colored by % watershed area &gt; 1000m (blue=high, orange=low)</a:t>
             </a:r>
             <a:endParaRPr/>
           </a:p>
@@ -5081,8 +5384,8 @@
         </p:nvSpPr>
         <p:spPr>
           <a:xfrm>
-            <a:off x="357840" y="224640"/>
-            <a:ext cx="8475840" cy="1114200"/>
+            <a:off x="335160" y="67680"/>
+            <a:ext cx="8233560" cy="1787040"/>
           </a:xfrm>
           <a:prstGeom prst="rect">
             <a:avLst/>
@@ -5104,7 +5407,7 @@
               <a:rPr lang="en-US">
                 <a:latin typeface="Arial"/>
               </a:rPr>
-              <a:t>The significant CCF values at negative lags imply that air temperature responds to</a:t>
+              <a:t>The significant CCF values at negative lags can be interpreted as,</a:t>
             </a:r>
             <a:endParaRPr/>
           </a:p>
@@ -5113,16 +5416,40 @@
               <a:rPr lang="en-US">
                 <a:latin typeface="Arial"/>
               </a:rPr>
-              <a:t>whatever the trend is tracking, 1, 5, and 17 months later. this must be noise.</a:t>
-            </a:r>
-            <a:endParaRPr/>
-          </a:p>
-          <a:p>
+              <a:t>“</a:t>
+            </a:r>
             <a:r>
               <a:rPr lang="en-US">
                 <a:latin typeface="Arial"/>
               </a:rPr>
-              <a:t>However, compare with the next CCF below.</a:t>
+              <a:t>air temperature is inversely correlated with whatever the trend is tracking, </a:t>
+            </a:r>
+            <a:endParaRPr/>
+          </a:p>
+          <a:p>
+            <a:r>
+              <a:rPr lang="en-US">
+                <a:latin typeface="Arial"/>
+              </a:rPr>
+              <a:t>1, 5, and 17 months later.”</a:t>
+            </a:r>
+            <a:endParaRPr/>
+          </a:p>
+          <a:p>
+            <a:r>
+              <a:rPr lang="en-US">
+                <a:latin typeface="Arial"/>
+              </a:rPr>
+              <a:t>We'd expect some significant lags by chance, so I won't read much into this, but</a:t>
+            </a:r>
+            <a:endParaRPr/>
+          </a:p>
+          <a:p>
+            <a:r>
+              <a:rPr lang="en-US">
+                <a:latin typeface="Arial"/>
+              </a:rPr>
+              <a:t>compare with the next CCF below.</a:t>
             </a:r>
             <a:endParaRPr/>
           </a:p>
@@ -5142,7 +5469,7 @@
         </p:blipFill>
         <p:spPr>
           <a:xfrm>
-            <a:off x="-36000" y="1311120"/>
+            <a:off x="-36000" y="1635120"/>
             <a:ext cx="9143640" cy="4371120"/>
           </a:xfrm>
           <a:prstGeom prst="rect">

</xml_diff>